<commit_message>
updates to OOP pres
</commit_message>
<xml_diff>
--- a/Presentations/Python - OOP.pptx
+++ b/Presentations/Python - OOP.pptx
@@ -198,7 +198,7 @@
           <a:p>
             <a:fld id="{FAF957FC-5175-49AC-8D2B-2F056FFFC1DD}" type="datetimeFigureOut">
               <a:rPr lang="en-US" smtClean="0"/>
-              <a:t>7/18/2017</a:t>
+              <a:t>7/19/2017</a:t>
             </a:fld>
             <a:endParaRPr lang="en-US"/>
           </a:p>
@@ -648,7 +648,7 @@
             <a:fld id="{1D8BD707-D9CF-40AE-B4C6-C98DA3205C09}" type="datetimeFigureOut">
               <a:rPr lang="en-US" smtClean="0"/>
               <a:pPr/>
-              <a:t>7/18/2017</a:t>
+              <a:t>7/19/2017</a:t>
             </a:fld>
             <a:endParaRPr lang="en-US"/>
           </a:p>
@@ -815,7 +815,7 @@
             <a:fld id="{1D8BD707-D9CF-40AE-B4C6-C98DA3205C09}" type="datetimeFigureOut">
               <a:rPr lang="en-US" smtClean="0"/>
               <a:pPr/>
-              <a:t>7/18/2017</a:t>
+              <a:t>7/19/2017</a:t>
             </a:fld>
             <a:endParaRPr lang="en-US"/>
           </a:p>
@@ -992,7 +992,7 @@
             <a:fld id="{1D8BD707-D9CF-40AE-B4C6-C98DA3205C09}" type="datetimeFigureOut">
               <a:rPr lang="en-US" smtClean="0"/>
               <a:pPr/>
-              <a:t>7/18/2017</a:t>
+              <a:t>7/19/2017</a:t>
             </a:fld>
             <a:endParaRPr lang="en-US"/>
           </a:p>
@@ -1159,7 +1159,7 @@
             <a:fld id="{1D8BD707-D9CF-40AE-B4C6-C98DA3205C09}" type="datetimeFigureOut">
               <a:rPr lang="en-US" smtClean="0"/>
               <a:pPr/>
-              <a:t>7/18/2017</a:t>
+              <a:t>7/19/2017</a:t>
             </a:fld>
             <a:endParaRPr lang="en-US"/>
           </a:p>
@@ -1402,7 +1402,7 @@
             <a:fld id="{1D8BD707-D9CF-40AE-B4C6-C98DA3205C09}" type="datetimeFigureOut">
               <a:rPr lang="en-US" smtClean="0"/>
               <a:pPr/>
-              <a:t>7/18/2017</a:t>
+              <a:t>7/19/2017</a:t>
             </a:fld>
             <a:endParaRPr lang="en-US"/>
           </a:p>
@@ -1687,7 +1687,7 @@
             <a:fld id="{1D8BD707-D9CF-40AE-B4C6-C98DA3205C09}" type="datetimeFigureOut">
               <a:rPr lang="en-US" smtClean="0"/>
               <a:pPr/>
-              <a:t>7/18/2017</a:t>
+              <a:t>7/19/2017</a:t>
             </a:fld>
             <a:endParaRPr lang="en-US"/>
           </a:p>
@@ -2106,7 +2106,7 @@
             <a:fld id="{1D8BD707-D9CF-40AE-B4C6-C98DA3205C09}" type="datetimeFigureOut">
               <a:rPr lang="en-US" smtClean="0"/>
               <a:pPr/>
-              <a:t>7/18/2017</a:t>
+              <a:t>7/19/2017</a:t>
             </a:fld>
             <a:endParaRPr lang="en-US"/>
           </a:p>
@@ -2221,7 +2221,7 @@
             <a:fld id="{1D8BD707-D9CF-40AE-B4C6-C98DA3205C09}" type="datetimeFigureOut">
               <a:rPr lang="en-US" smtClean="0"/>
               <a:pPr/>
-              <a:t>7/18/2017</a:t>
+              <a:t>7/19/2017</a:t>
             </a:fld>
             <a:endParaRPr lang="en-US"/>
           </a:p>
@@ -2313,7 +2313,7 @@
             <a:fld id="{1D8BD707-D9CF-40AE-B4C6-C98DA3205C09}" type="datetimeFigureOut">
               <a:rPr lang="en-US" smtClean="0"/>
               <a:pPr/>
-              <a:t>7/18/2017</a:t>
+              <a:t>7/19/2017</a:t>
             </a:fld>
             <a:endParaRPr lang="en-US"/>
           </a:p>
@@ -2587,7 +2587,7 @@
             <a:fld id="{1D8BD707-D9CF-40AE-B4C6-C98DA3205C09}" type="datetimeFigureOut">
               <a:rPr lang="en-US" smtClean="0"/>
               <a:pPr/>
-              <a:t>7/18/2017</a:t>
+              <a:t>7/19/2017</a:t>
             </a:fld>
             <a:endParaRPr lang="en-US"/>
           </a:p>
@@ -2837,7 +2837,7 @@
             <a:fld id="{1D8BD707-D9CF-40AE-B4C6-C98DA3205C09}" type="datetimeFigureOut">
               <a:rPr lang="en-US" smtClean="0"/>
               <a:pPr/>
-              <a:t>7/18/2017</a:t>
+              <a:t>7/19/2017</a:t>
             </a:fld>
             <a:endParaRPr lang="en-US"/>
           </a:p>
@@ -3047,7 +3047,7 @@
             <a:fld id="{1D8BD707-D9CF-40AE-B4C6-C98DA3205C09}" type="datetimeFigureOut">
               <a:rPr lang="en-US" smtClean="0"/>
               <a:pPr/>
-              <a:t>7/18/2017</a:t>
+              <a:t>7/19/2017</a:t>
             </a:fld>
             <a:endParaRPr lang="en-US"/>
           </a:p>
@@ -4729,8 +4729,13 @@
             </a:r>
             <a:r>
               <a:rPr lang="en-US" dirty="0"/>
-              <a:t> Node:</a:t>
-            </a:r>
+              <a:t> </a:t>
+            </a:r>
+            <a:r>
+              <a:rPr lang="en-US" dirty="0" smtClean="0"/>
+              <a:t>Node:</a:t>
+            </a:r>
+            <a:endParaRPr lang="en-US" dirty="0"/>
           </a:p>
           <a:p>
             <a:r>
@@ -7361,8 +7366,13 @@
             </a:r>
             <a:r>
               <a:rPr lang="en-US" sz="1600" dirty="0" smtClean="0"/>
-              <a:t>if None == next:</a:t>
-            </a:r>
+              <a:t>if </a:t>
+            </a:r>
+            <a:r>
+              <a:rPr lang="en-US" sz="1600" dirty="0" smtClean="0"/>
+              <a:t>next is None:</a:t>
+            </a:r>
+            <a:endParaRPr lang="en-US" sz="1600" dirty="0" smtClean="0"/>
           </a:p>
           <a:p>
             <a:r>
@@ -8214,10 +8224,14 @@
             </a:r>
             <a:r>
               <a:rPr lang="en-US" dirty="0" smtClean="0"/>
-              <a:t>	Node</a:t>
-            </a:r>
-            <a:r>
-              <a:rPr lang="en-US" dirty="0">
+              <a:t>	</a:t>
+            </a:r>
+            <a:r>
+              <a:rPr lang="en-US" dirty="0" smtClean="0"/>
+              <a:t>super()</a:t>
+            </a:r>
+            <a:r>
+              <a:rPr lang="en-US" dirty="0" smtClean="0">
                 <a:solidFill>
                   <a:srgbClr val="0070C0"/>
                 </a:solidFill>
@@ -8428,6 +8442,118 @@
           <a:p>
             <a:pPr algn="ctr"/>
             <a:endParaRPr lang="en-US"/>
+          </a:p>
+        </p:txBody>
+      </p:sp>
+      <p:sp>
+        <p:nvSpPr>
+          <p:cNvPr id="4" name="TextBox 3"/>
+          <p:cNvSpPr txBox="1"/>
+          <p:nvPr/>
+        </p:nvSpPr>
+        <p:spPr>
+          <a:xfrm>
+            <a:off x="568117" y="5794075"/>
+            <a:ext cx="7966283" cy="830997"/>
+          </a:xfrm>
+          <a:prstGeom prst="rect">
+            <a:avLst/>
+          </a:prstGeom>
+          <a:noFill/>
+          <a:ln w="12700">
+            <a:solidFill>
+              <a:schemeClr val="tx1"/>
+            </a:solidFill>
+            <a:prstDash val="dash"/>
+          </a:ln>
+        </p:spPr>
+        <p:txBody>
+          <a:bodyPr wrap="none" rtlCol="0">
+            <a:spAutoFit/>
+          </a:bodyPr>
+          <a:lstStyle/>
+          <a:p>
+            <a:r>
+              <a:rPr lang="en-US" sz="1200" b="1" i="1" dirty="0"/>
+              <a:t>Good Practice</a:t>
+            </a:r>
+            <a:r>
+              <a:rPr lang="en-US" sz="1200" dirty="0"/>
+              <a:t>: it's generally considered good practice to have non-inheriting classes explicitly inherit from the "object" </a:t>
+            </a:r>
+            <a:r>
+              <a:rPr lang="en-US" sz="1200" dirty="0" smtClean="0"/>
+              <a:t>class.</a:t>
+            </a:r>
+          </a:p>
+          <a:p>
+            <a:endParaRPr lang="en-US" sz="1200" dirty="0"/>
+          </a:p>
+          <a:p>
+            <a:r>
+              <a:rPr lang="en-US" sz="1200" b="1" i="1" dirty="0"/>
+              <a:t> </a:t>
+            </a:r>
+            <a:r>
+              <a:rPr lang="en-US" sz="1200" b="1" i="1" dirty="0" smtClean="0"/>
+              <a:t>Example: </a:t>
+            </a:r>
+            <a:r>
+              <a:rPr lang="en-US" sz="1200" dirty="0" smtClean="0">
+                <a:solidFill>
+                  <a:srgbClr val="00B050"/>
+                </a:solidFill>
+              </a:rPr>
+              <a:t>class </a:t>
+            </a:r>
+            <a:r>
+              <a:rPr lang="en-US" sz="1200" dirty="0">
+                <a:solidFill>
+                  <a:srgbClr val="00B050"/>
+                </a:solidFill>
+              </a:rPr>
+              <a:t>Node</a:t>
+            </a:r>
+            <a:r>
+              <a:rPr lang="en-US" sz="1200" dirty="0" smtClean="0">
+                <a:solidFill>
+                  <a:srgbClr val="00B050"/>
+                </a:solidFill>
+              </a:rPr>
+              <a:t>: </a:t>
+            </a:r>
+            <a:r>
+              <a:rPr lang="en-US" sz="1200" dirty="0" smtClean="0"/>
+              <a:t>would become </a:t>
+            </a:r>
+            <a:r>
+              <a:rPr lang="en-US" sz="1200" dirty="0" smtClean="0">
+                <a:solidFill>
+                  <a:srgbClr val="00B050"/>
+                </a:solidFill>
+              </a:rPr>
+              <a:t>class Node(object):</a:t>
+            </a:r>
+            <a:r>
+              <a:rPr lang="en-US" sz="1200" dirty="0">
+                <a:solidFill>
+                  <a:srgbClr val="00B050"/>
+                </a:solidFill>
+              </a:rPr>
+              <a:t/>
+            </a:r>
+            <a:br>
+              <a:rPr lang="en-US" sz="1200" dirty="0">
+                <a:solidFill>
+                  <a:srgbClr val="00B050"/>
+                </a:solidFill>
+              </a:rPr>
+            </a:br>
+            <a:endParaRPr lang="en-US" sz="1200" dirty="0">
+              <a:solidFill>
+                <a:srgbClr val="00B050"/>
+              </a:solidFill>
+            </a:endParaRPr>
           </a:p>
         </p:txBody>
       </p:sp>

</xml_diff>